<commit_message>
minor edits to a couple of PowerPoint slides
</commit_message>
<xml_diff>
--- a/PowerPoints/00 - Teaching Compiler Design.pptx
+++ b/PowerPoints/00 - Teaching Compiler Design.pptx
@@ -5,10 +5,10 @@
     <p:sldMasterId id="2147483651" r:id="rId1"/>
   </p:sldMasterIdLst>
   <p:notesMasterIdLst>
-    <p:notesMasterId r:id="rId13"/>
+    <p:notesMasterId r:id="rId12"/>
   </p:notesMasterIdLst>
   <p:handoutMasterIdLst>
-    <p:handoutMasterId r:id="rId14"/>
+    <p:handoutMasterId r:id="rId13"/>
   </p:handoutMasterIdLst>
   <p:sldIdLst>
     <p:sldId id="256" r:id="rId2"/>
@@ -20,8 +20,7 @@
     <p:sldId id="261" r:id="rId8"/>
     <p:sldId id="262" r:id="rId9"/>
     <p:sldId id="263" r:id="rId10"/>
-    <p:sldId id="264" r:id="rId11"/>
-    <p:sldId id="267" r:id="rId12"/>
+    <p:sldId id="267" r:id="rId11"/>
   </p:sldIdLst>
   <p:sldSz cx="9144000" cy="6858000" type="screen4x3"/>
   <p:notesSz cx="7315200" cy="9601200"/>
@@ -2533,176 +2532,6 @@
       </p:grpSpPr>
       <p:sp>
         <p:nvSpPr>
-          <p:cNvPr id="2" name="Title 1"/>
-          <p:cNvSpPr>
-            <a:spLocks noGrp="1"/>
-          </p:cNvSpPr>
-          <p:nvPr>
-            <p:ph type="title"/>
-          </p:nvPr>
-        </p:nvSpPr>
-        <p:spPr/>
-        <p:txBody>
-          <a:bodyPr/>
-          <a:lstStyle/>
-          <a:p>
-            <a:r>
-              <a:rPr lang="en-US" dirty="0"/>
-              <a:t>Challenging Project Variations</a:t>
-            </a:r>
-            <a:br>
-              <a:rPr lang="en-US" dirty="0"/>
-            </a:br>
-            <a:r>
-              <a:rPr lang="en-US" sz="2400" dirty="0"/>
-              <a:t>(continued)</a:t>
-            </a:r>
-          </a:p>
-        </p:txBody>
-      </p:sp>
-      <p:sp>
-        <p:nvSpPr>
-          <p:cNvPr id="3" name="Content Placeholder 2"/>
-          <p:cNvSpPr>
-            <a:spLocks noGrp="1"/>
-          </p:cNvSpPr>
-          <p:nvPr>
-            <p:ph idx="1"/>
-          </p:nvPr>
-        </p:nvSpPr>
-        <p:spPr/>
-        <p:txBody>
-          <a:bodyPr/>
-          <a:lstStyle/>
-          <a:p>
-            <a:r>
-              <a:rPr lang="en-US" dirty="0"/>
-              <a:t>Implement the project in a different language</a:t>
-            </a:r>
-          </a:p>
-          <a:p>
-            <a:pPr marL="457200" lvl="1" indent="0">
-              <a:buNone/>
-            </a:pPr>
-            <a:r>
-              <a:rPr lang="en-US" dirty="0"/>
-              <a:t>(e.g., C++, Swift, Python, or C#)</a:t>
-            </a:r>
-          </a:p>
-          <a:p>
-            <a:r>
-              <a:rPr lang="en-US" dirty="0"/>
-              <a:t>Implement constraint analysis and code generation using the visitor design pattern</a:t>
-            </a:r>
-          </a:p>
-          <a:p>
-            <a:r>
-              <a:rPr lang="en-US" dirty="0"/>
-              <a:t>Redesign code generation to allow for multiple targets</a:t>
-            </a:r>
-          </a:p>
-          <a:p>
-            <a:pPr lvl="1"/>
-            <a:r>
-              <a:rPr lang="en-US" dirty="0"/>
-              <a:t>use a universal, machine-independent back end (e.g., LLVM)</a:t>
-            </a:r>
-          </a:p>
-          <a:p>
-            <a:pPr lvl="1"/>
-            <a:r>
-              <a:rPr lang="en-US" dirty="0"/>
-              <a:t>use design patterns to create a code-generation factory</a:t>
-            </a:r>
-          </a:p>
-          <a:p>
-            <a:pPr lvl="1"/>
-            <a:endParaRPr lang="en-US" dirty="0"/>
-          </a:p>
-        </p:txBody>
-      </p:sp>
-      <p:sp>
-        <p:nvSpPr>
-          <p:cNvPr id="4" name="Footer Placeholder 3"/>
-          <p:cNvSpPr>
-            <a:spLocks noGrp="1"/>
-          </p:cNvSpPr>
-          <p:nvPr>
-            <p:ph type="ftr" sz="quarter" idx="10"/>
-          </p:nvPr>
-        </p:nvSpPr>
-        <p:spPr/>
-        <p:txBody>
-          <a:bodyPr/>
-          <a:lstStyle/>
-          <a:p>
-            <a:r>
-              <a:rPr lang="en-US"/>
-              <a:t>©SoftMoore Consulting</a:t>
-            </a:r>
-          </a:p>
-        </p:txBody>
-      </p:sp>
-      <p:sp>
-        <p:nvSpPr>
-          <p:cNvPr id="5" name="Slide Number Placeholder 4"/>
-          <p:cNvSpPr>
-            <a:spLocks noGrp="1"/>
-          </p:cNvSpPr>
-          <p:nvPr>
-            <p:ph type="sldNum" sz="quarter" idx="11"/>
-          </p:nvPr>
-        </p:nvSpPr>
-        <p:spPr/>
-        <p:txBody>
-          <a:bodyPr/>
-          <a:lstStyle/>
-          <a:p>
-            <a:r>
-              <a:rPr lang="en-US"/>
-              <a:t>Slide </a:t>
-            </a:r>
-            <a:fld id="{8BB80151-2449-435E-BE2D-33BFC1CA30E8}" type="slidenum">
-              <a:rPr lang="en-US" smtClean="0"/>
-              <a:pPr/>
-              <a:t>10</a:t>
-            </a:fld>
-            <a:endParaRPr lang="en-US"/>
-          </a:p>
-        </p:txBody>
-      </p:sp>
-    </p:spTree>
-    <p:extLst>
-      <p:ext uri="{BB962C8B-B14F-4D97-AF65-F5344CB8AC3E}">
-        <p14:creationId xmlns:p14="http://schemas.microsoft.com/office/powerpoint/2010/main" val="1078435661"/>
-      </p:ext>
-    </p:extLst>
-  </p:cSld>
-  <p:clrMapOvr>
-    <a:masterClrMapping/>
-  </p:clrMapOvr>
-</p:sld>
-</file>
-
-<file path=ppt/slides/slide11.xml><?xml version="1.0" encoding="utf-8"?>
-<p:sld xmlns:a="http://schemas.openxmlformats.org/drawingml/2006/main" xmlns:r="http://schemas.openxmlformats.org/officeDocument/2006/relationships" xmlns:p="http://schemas.openxmlformats.org/presentationml/2006/main">
-  <p:cSld>
-    <p:spTree>
-      <p:nvGrpSpPr>
-        <p:cNvPr id="1" name=""/>
-        <p:cNvGrpSpPr/>
-        <p:nvPr/>
-      </p:nvGrpSpPr>
-      <p:grpSpPr>
-        <a:xfrm>
-          <a:off x="0" y="0"/>
-          <a:ext cx="0" cy="0"/>
-          <a:chOff x="0" y="0"/>
-          <a:chExt cx="0" cy="0"/>
-        </a:xfrm>
-      </p:grpSpPr>
-      <p:sp>
-        <p:nvSpPr>
           <p:cNvPr id="2" name="Title 1">
             <a:extLst>
               <a:ext uri="{FF2B5EF4-FFF2-40B4-BE49-F238E27FC236}">
@@ -2858,7 +2687,7 @@
             <a:fld id="{8BB80151-2449-435E-BE2D-33BFC1CA30E8}" type="slidenum">
               <a:rPr lang="en-US" smtClean="0"/>
               <a:pPr/>
-              <a:t>11</a:t>
+              <a:t>10</a:t>
             </a:fld>
             <a:endParaRPr lang="en-US"/>
           </a:p>
@@ -4594,74 +4423,52 @@
             </a:r>
           </a:p>
           <a:p>
+            <a:r>
+              <a:rPr lang="en-US" dirty="0"/>
+              <a:t>Modify target language/machine</a:t>
+            </a:r>
+          </a:p>
+          <a:p>
             <a:pPr lvl="1"/>
             <a:r>
               <a:rPr lang="en-US" dirty="0"/>
-              <a:t>predefined environment with </a:t>
-            </a:r>
-            <a:r>
-              <a:rPr lang="en-US" dirty="0" err="1"/>
-              <a:t>builtin</a:t>
-            </a:r>
-            <a:r>
-              <a:rPr lang="en-US" dirty="0"/>
-              <a:t> procedures/functions</a:t>
+              <a:t>real machine, or assembly language for a real machine</a:t>
             </a:r>
             <a:br>
               <a:rPr lang="en-US" dirty="0"/>
             </a:br>
             <a:r>
               <a:rPr lang="en-US" dirty="0"/>
-              <a:t>(make Boolean a predefined </a:t>
-            </a:r>
-            <a:r>
-              <a:rPr lang="en-US" dirty="0" err="1"/>
-              <a:t>enum</a:t>
-            </a:r>
-            <a:r>
-              <a:rPr lang="en-US" dirty="0"/>
-              <a:t> type)</a:t>
-            </a:r>
-          </a:p>
-          <a:p>
-            <a:r>
-              <a:rPr lang="en-US" dirty="0"/>
-              <a:t>Modify target language/machine</a:t>
+              <a:t>(e.g., Intel x86-64)</a:t>
             </a:r>
           </a:p>
           <a:p>
             <a:pPr lvl="1"/>
             <a:r>
               <a:rPr lang="en-US" dirty="0"/>
-              <a:t>real machine, or assembly language for a real machine</a:t>
-            </a:r>
-            <a:br>
-              <a:rPr lang="en-US" dirty="0"/>
-            </a:br>
-            <a:r>
-              <a:rPr lang="en-US" dirty="0"/>
-              <a:t>(e.g., Intel x86-64)</a:t>
+              <a:t>JVM or assembly language for JVM</a:t>
             </a:r>
           </a:p>
           <a:p>
             <a:pPr lvl="1"/>
             <a:r>
               <a:rPr lang="en-US" dirty="0"/>
-              <a:t>JVM or assembly language for JVM</a:t>
-            </a:r>
-          </a:p>
-          <a:p>
-            <a:pPr lvl="1"/>
-            <a:r>
-              <a:rPr lang="en-US" dirty="0"/>
-              <a:t>Common Language Runtime (part of Microsoft’s .NET Framework)</a:t>
-            </a:r>
-          </a:p>
-          <a:p>
-            <a:pPr lvl="1"/>
-            <a:r>
-              <a:rPr lang="en-US" dirty="0"/>
               <a:t>C programming language (e.g., first C++ “compilers”)</a:t>
+            </a:r>
+          </a:p>
+          <a:p>
+            <a:r>
+              <a:rPr lang="en-US" dirty="0"/>
+              <a:t>Implement the project in a different language</a:t>
+            </a:r>
+          </a:p>
+          <a:p>
+            <a:pPr marL="457200" lvl="1" indent="0">
+              <a:buNone/>
+            </a:pPr>
+            <a:r>
+              <a:rPr lang="en-US" dirty="0"/>
+              <a:t>(e.g., C++, Swift, Python, or C#)</a:t>
             </a:r>
           </a:p>
         </p:txBody>

</xml_diff>

<commit_message>
minor correction to one PowerPoint slide
</commit_message>
<xml_diff>
--- a/PowerPoints/00 - Teaching Compiler Design.pptx
+++ b/PowerPoints/00 - Teaching Compiler Design.pptx
@@ -2608,14 +2608,13 @@
           <a:p>
             <a:r>
               <a:rPr lang="en-US" dirty="0"/>
-              <a:t>Source code or skeletal source code for various parts of the compiler</a:t>
-            </a:r>
-          </a:p>
-          <a:p>
-            <a:r>
-              <a:rPr lang="en-US" dirty="0"/>
-              <a:t>Language documentation files for the full CPRL compiler</a:t>
-            </a:r>
+              <a:t>Source code or skeletal source code for various parts of </a:t>
+            </a:r>
+            <a:r>
+              <a:rPr lang="en-US"/>
+              <a:t>the compiler</a:t>
+            </a:r>
+            <a:endParaRPr lang="en-US" dirty="0"/>
           </a:p>
           <a:p>
             <a:r>

</xml_diff>